<commit_message>
Final adjustments for e1
</commit_message>
<xml_diff>
--- a/5_MultipleCorrection.pptx
+++ b/5_MultipleCorrection.pptx
@@ -12,8 +12,8 @@
   </p:handoutMasterIdLst>
   <p:sldIdLst>
     <p:sldId id="352" r:id="rId2"/>
-    <p:sldId id="366" r:id="rId3"/>
-    <p:sldId id="367" r:id="rId4"/>
+    <p:sldId id="367" r:id="rId3"/>
+    <p:sldId id="366" r:id="rId4"/>
   </p:sldIdLst>
   <p:sldSz cx="12192000" cy="6858000"/>
   <p:notesSz cx="6858000" cy="9144000"/>
@@ -216,7 +216,7 @@
           <a:p>
             <a:fld id="{73D5C047-4BF6-2244-A5E3-D41B1218D9A5}" type="datetimeFigureOut">
               <a:rPr lang="en-GB" smtClean="0"/>
-              <a:t>16/08/2024</a:t>
+              <a:t>19/08/2024</a:t>
             </a:fld>
             <a:endParaRPr lang="en-GB"/>
           </a:p>
@@ -381,7 +381,7 @@
           <a:p>
             <a:fld id="{8A376A05-844D-A64C-9434-FF3712A59FB6}" type="datetimeFigureOut">
               <a:rPr lang="en-GB" smtClean="0"/>
-              <a:t>16/08/2024</a:t>
+              <a:t>19/08/2024</a:t>
             </a:fld>
             <a:endParaRPr lang="en-GB"/>
           </a:p>
@@ -832,7 +832,7 @@
     </p:spTree>
     <p:extLst>
       <p:ext uri="{BB962C8B-B14F-4D97-AF65-F5344CB8AC3E}">
-        <p14:creationId xmlns:p14="http://schemas.microsoft.com/office/powerpoint/2010/main" val="2985429439"/>
+        <p14:creationId xmlns:p14="http://schemas.microsoft.com/office/powerpoint/2010/main" val="1819787041"/>
       </p:ext>
     </p:extLst>
   </p:cSld>
@@ -916,7 +916,7 @@
     </p:spTree>
     <p:extLst>
       <p:ext uri="{BB962C8B-B14F-4D97-AF65-F5344CB8AC3E}">
-        <p14:creationId xmlns:p14="http://schemas.microsoft.com/office/powerpoint/2010/main" val="1819787041"/>
+        <p14:creationId xmlns:p14="http://schemas.microsoft.com/office/powerpoint/2010/main" val="2985429439"/>
       </p:ext>
     </p:extLst>
   </p:cSld>
@@ -9719,7 +9719,7 @@
           <a:p>
             <a:fld id="{5D8171C0-695E-BD4E-B021-8976B44C063A}" type="datetime1">
               <a:rPr lang="en-SG" smtClean="0"/>
-              <a:t>16/8/24</a:t>
+              <a:t>19/8/24</a:t>
             </a:fld>
             <a:endParaRPr lang="en-GB"/>
           </a:p>
@@ -9926,7 +9926,7 @@
           <a:p>
             <a:fld id="{6F853C54-8EB9-C24B-9C31-2B1DDC9DE9A6}" type="datetime1">
               <a:rPr lang="en-SG" smtClean="0"/>
-              <a:t>16/8/24</a:t>
+              <a:t>19/8/24</a:t>
             </a:fld>
             <a:endParaRPr lang="en-GB"/>
           </a:p>
@@ -10101,7 +10101,7 @@
           <a:p>
             <a:fld id="{3472FA3B-614A-7B44-98FC-38DCC6EB32F4}" type="datetime1">
               <a:rPr lang="en-SG" smtClean="0"/>
-              <a:t>16/8/24</a:t>
+              <a:t>19/8/24</a:t>
             </a:fld>
             <a:endParaRPr lang="en-GB"/>
           </a:p>
@@ -10335,7 +10335,7 @@
           <a:p>
             <a:fld id="{159A31D3-5D48-6C49-8100-1BFEDDA27045}" type="datetime1">
               <a:rPr lang="en-SG" smtClean="0"/>
-              <a:t>16/8/24</a:t>
+              <a:t>19/8/24</a:t>
             </a:fld>
             <a:endParaRPr lang="en-GB"/>
           </a:p>
@@ -19240,7 +19240,7 @@
           <a:p>
             <a:fld id="{33FB4DE5-3FA5-CB41-9D0A-192659D1CB71}" type="datetime1">
               <a:rPr lang="en-SG" smtClean="0"/>
-              <a:t>16/8/24</a:t>
+              <a:t>19/8/24</a:t>
             </a:fld>
             <a:endParaRPr lang="en-GB"/>
           </a:p>
@@ -19513,7 +19513,7 @@
           <a:p>
             <a:fld id="{2BA4E459-705C-6E47-A7D6-9BAC4DCC79E5}" type="datetime1">
               <a:rPr lang="en-SG" smtClean="0"/>
-              <a:t>16/8/24</a:t>
+              <a:t>19/8/24</a:t>
             </a:fld>
             <a:endParaRPr lang="en-GB"/>
           </a:p>
@@ -19911,7 +19911,7 @@
           <a:p>
             <a:fld id="{7A41D9F5-A799-534F-ADC1-59DEE366892C}" type="datetime1">
               <a:rPr lang="en-SG" smtClean="0"/>
-              <a:t>16/8/24</a:t>
+              <a:t>19/8/24</a:t>
             </a:fld>
             <a:endParaRPr lang="en-GB"/>
           </a:p>
@@ -20029,7 +20029,7 @@
           <a:p>
             <a:fld id="{65CD0D58-1596-D242-A555-BB899CD37BDE}" type="datetime1">
               <a:rPr lang="en-SG" smtClean="0"/>
-              <a:t>16/8/24</a:t>
+              <a:t>19/8/24</a:t>
             </a:fld>
             <a:endParaRPr lang="en-GB"/>
           </a:p>
@@ -20119,7 +20119,7 @@
           <a:p>
             <a:fld id="{C6195D21-BC09-2042-8183-6DEFCDF5312A}" type="datetime1">
               <a:rPr lang="en-SG" smtClean="0"/>
-              <a:t>16/8/24</a:t>
+              <a:t>19/8/24</a:t>
             </a:fld>
             <a:endParaRPr lang="en-GB"/>
           </a:p>
@@ -20409,7 +20409,7 @@
           <a:p>
             <a:fld id="{96BFDC18-B983-004C-8152-2C2BF2CFEDD7}" type="datetime1">
               <a:rPr lang="en-SG" smtClean="0"/>
-              <a:t>16/8/24</a:t>
+              <a:t>19/8/24</a:t>
             </a:fld>
             <a:endParaRPr lang="en-GB"/>
           </a:p>
@@ -20689,7 +20689,7 @@
           <a:p>
             <a:fld id="{2B69BD44-7826-F548-A836-9F6150569590}" type="datetime1">
               <a:rPr lang="en-SG" smtClean="0"/>
-              <a:t>16/8/24</a:t>
+              <a:t>19/8/24</a:t>
             </a:fld>
             <a:endParaRPr lang="en-GB"/>
           </a:p>
@@ -21057,7 +21057,7 @@
           <a:p>
             <a:fld id="{2DC3BF20-5808-0847-A21A-F2A835930045}" type="datetime1">
               <a:rPr lang="en-SG" smtClean="0"/>
-              <a:t>16/8/24</a:t>
+              <a:t>19/8/24</a:t>
             </a:fld>
             <a:endParaRPr lang="en-GB"/>
           </a:p>
@@ -22051,6 +22051,229 @@
           <a:p>
             <a:r>
               <a:rPr lang="en-GB" sz="3600" dirty="0"/>
+              <a:t>Multiple testing – </a:t>
+            </a:r>
+            <a:r>
+              <a:rPr lang="en-GB" sz="3600" dirty="0" err="1"/>
+              <a:t>Benjamini</a:t>
+            </a:r>
+            <a:r>
+              <a:rPr lang="en-GB" sz="3600" dirty="0"/>
+              <a:t>-Hochberg method</a:t>
+            </a:r>
+            <a:endParaRPr lang="en-GB" sz="3600" cap="none" dirty="0">
+              <a:latin typeface="+mn-lt"/>
+            </a:endParaRPr>
+          </a:p>
+        </p:txBody>
+      </p:sp>
+      <p:sp>
+        <p:nvSpPr>
+          <p:cNvPr id="4" name="Content Placeholder 3">
+            <a:extLst>
+              <a:ext uri="{FF2B5EF4-FFF2-40B4-BE49-F238E27FC236}">
+                <a16:creationId xmlns:a16="http://schemas.microsoft.com/office/drawing/2014/main" id="{5F0F6D09-21D1-B445-A0D3-811B8173FDA9}"/>
+              </a:ext>
+            </a:extLst>
+          </p:cNvPr>
+          <p:cNvSpPr>
+            <a:spLocks noGrp="1"/>
+          </p:cNvSpPr>
+          <p:nvPr>
+            <p:ph idx="1"/>
+          </p:nvPr>
+        </p:nvSpPr>
+        <p:spPr>
+          <a:xfrm>
+            <a:off x="1024129" y="1873045"/>
+            <a:ext cx="10140399" cy="4984955"/>
+          </a:xfrm>
+        </p:spPr>
+        <p:txBody>
+          <a:bodyPr>
+            <a:normAutofit/>
+          </a:bodyPr>
+          <a:lstStyle/>
+          <a:p>
+            <a:pPr marL="0" indent="0">
+              <a:buNone/>
+            </a:pPr>
+            <a:r>
+              <a:rPr lang="en-GB" sz="2400" dirty="0"/>
+              <a:t>For given </a:t>
+            </a:r>
+            <a:r>
+              <a:rPr lang="el-GR" sz="2400" dirty="0"/>
+              <a:t>α</a:t>
+            </a:r>
+            <a:r>
+              <a:rPr lang="en-GB" sz="2400" dirty="0"/>
+              <a:t> let k find the largest k such that P</a:t>
+            </a:r>
+            <a:r>
+              <a:rPr lang="en-GB" sz="2400" baseline="-25000" dirty="0"/>
+              <a:t>(k)</a:t>
+            </a:r>
+            <a:r>
+              <a:rPr lang="en-GB" sz="2400" dirty="0"/>
+              <a:t> ≤ (k/m)</a:t>
+            </a:r>
+            <a:r>
+              <a:rPr lang="el-GR" sz="2400" dirty="0"/>
+              <a:t> α</a:t>
+            </a:r>
+            <a:endParaRPr lang="en-GB" sz="2400" dirty="0"/>
+          </a:p>
+          <a:p>
+            <a:pPr marL="0" indent="0">
+              <a:buNone/>
+            </a:pPr>
+            <a:r>
+              <a:rPr lang="en-GB" sz="2400" dirty="0"/>
+              <a:t>and reject null hypothesis H</a:t>
+            </a:r>
+            <a:r>
+              <a:rPr lang="en-GB" sz="2400" baseline="-25000" dirty="0"/>
+              <a:t>i</a:t>
+            </a:r>
+            <a:r>
+              <a:rPr lang="en-GB" sz="2400" dirty="0"/>
+              <a:t> for </a:t>
+            </a:r>
+            <a:r>
+              <a:rPr lang="en-GB" sz="2400" dirty="0" err="1"/>
+              <a:t>i</a:t>
+            </a:r>
+            <a:r>
+              <a:rPr lang="en-GB" sz="2400" dirty="0"/>
+              <a:t>=1,..,k</a:t>
+            </a:r>
+          </a:p>
+          <a:p>
+            <a:pPr marL="811842" lvl="1" indent="-541338">
+              <a:lnSpc>
+                <a:spcPct val="150000"/>
+              </a:lnSpc>
+              <a:buFont typeface="Wingdings" pitchFamily="2" charset="2"/>
+              <a:buChar char="v"/>
+            </a:pPr>
+            <a:endParaRPr lang="en-GB" sz="1600" dirty="0">
+              <a:latin typeface="Menlo" panose="020B0609030804020204" pitchFamily="49" charset="0"/>
+              <a:ea typeface="Menlo" panose="020B0609030804020204" pitchFamily="49" charset="0"/>
+              <a:cs typeface="Menlo" panose="020B0609030804020204" pitchFamily="49" charset="0"/>
+            </a:endParaRPr>
+          </a:p>
+          <a:p>
+            <a:pPr marL="811842" lvl="1" indent="-541338">
+              <a:lnSpc>
+                <a:spcPct val="150000"/>
+              </a:lnSpc>
+              <a:buFont typeface="Wingdings" pitchFamily="2" charset="2"/>
+              <a:buChar char="v"/>
+            </a:pPr>
+            <a:endParaRPr lang="en-GB" sz="2200" dirty="0"/>
+          </a:p>
+          <a:p>
+            <a:pPr marL="811842" lvl="1" indent="-541338">
+              <a:lnSpc>
+                <a:spcPct val="150000"/>
+              </a:lnSpc>
+              <a:buFont typeface="Wingdings" pitchFamily="2" charset="2"/>
+              <a:buChar char="v"/>
+            </a:pPr>
+            <a:endParaRPr lang="en-GB" sz="2200" dirty="0"/>
+          </a:p>
+        </p:txBody>
+      </p:sp>
+      <p:sp>
+        <p:nvSpPr>
+          <p:cNvPr id="3" name="Slide Number Placeholder 2">
+            <a:extLst>
+              <a:ext uri="{FF2B5EF4-FFF2-40B4-BE49-F238E27FC236}">
+                <a16:creationId xmlns:a16="http://schemas.microsoft.com/office/drawing/2014/main" id="{C6E5CD97-EBA1-B146-AC2F-3BBCE1ADE91D}"/>
+              </a:ext>
+            </a:extLst>
+          </p:cNvPr>
+          <p:cNvSpPr>
+            <a:spLocks noGrp="1"/>
+          </p:cNvSpPr>
+          <p:nvPr>
+            <p:ph type="sldNum" sz="quarter" idx="12"/>
+          </p:nvPr>
+        </p:nvSpPr>
+        <p:spPr/>
+        <p:txBody>
+          <a:bodyPr/>
+          <a:lstStyle/>
+          <a:p>
+            <a:fld id="{9F3C1A03-04C2-0846-ADDA-213E9916F0D3}" type="slidenum">
+              <a:rPr lang="en-GB" smtClean="0"/>
+              <a:t>2</a:t>
+            </a:fld>
+            <a:endParaRPr lang="en-GB"/>
+          </a:p>
+        </p:txBody>
+      </p:sp>
+    </p:spTree>
+    <p:extLst>
+      <p:ext uri="{BB962C8B-B14F-4D97-AF65-F5344CB8AC3E}">
+        <p14:creationId xmlns:p14="http://schemas.microsoft.com/office/powerpoint/2010/main" val="2650360599"/>
+      </p:ext>
+    </p:extLst>
+  </p:cSld>
+  <p:clrMapOvr>
+    <a:masterClrMapping/>
+  </p:clrMapOvr>
+</p:sld>
+</file>
+
+<file path=ppt/slides/slide3.xml><?xml version="1.0" encoding="utf-8"?>
+<p:sld xmlns:a="http://schemas.openxmlformats.org/drawingml/2006/main" xmlns:r="http://schemas.openxmlformats.org/officeDocument/2006/relationships" xmlns:p="http://schemas.openxmlformats.org/presentationml/2006/main">
+  <p:cSld>
+    <p:spTree>
+      <p:nvGrpSpPr>
+        <p:cNvPr id="1" name=""/>
+        <p:cNvGrpSpPr/>
+        <p:nvPr/>
+      </p:nvGrpSpPr>
+      <p:grpSpPr>
+        <a:xfrm>
+          <a:off x="0" y="0"/>
+          <a:ext cx="0" cy="0"/>
+          <a:chOff x="0" y="0"/>
+          <a:chExt cx="0" cy="0"/>
+        </a:xfrm>
+      </p:grpSpPr>
+      <p:sp>
+        <p:nvSpPr>
+          <p:cNvPr id="2" name="Title 1">
+            <a:extLst>
+              <a:ext uri="{FF2B5EF4-FFF2-40B4-BE49-F238E27FC236}">
+                <a16:creationId xmlns:a16="http://schemas.microsoft.com/office/drawing/2014/main" id="{67D32647-30F0-3B45-868F-FBC0B1734A50}"/>
+              </a:ext>
+            </a:extLst>
+          </p:cNvPr>
+          <p:cNvSpPr>
+            <a:spLocks noGrp="1"/>
+          </p:cNvSpPr>
+          <p:nvPr>
+            <p:ph type="title"/>
+          </p:nvPr>
+        </p:nvSpPr>
+        <p:spPr>
+          <a:xfrm>
+            <a:off x="1024127" y="402336"/>
+            <a:ext cx="10140401" cy="1219987"/>
+          </a:xfrm>
+        </p:spPr>
+        <p:txBody>
+          <a:bodyPr>
+            <a:normAutofit/>
+          </a:bodyPr>
+          <a:lstStyle/>
+          <a:p>
+            <a:r>
+              <a:rPr lang="en-GB" sz="3600" dirty="0"/>
               <a:t>Multiple testing – Bonferroni-holm method</a:t>
             </a:r>
             <a:endParaRPr lang="en-GB" sz="3600" cap="none" dirty="0">
@@ -22311,7 +22534,7 @@
           <a:p>
             <a:fld id="{9F3C1A03-04C2-0846-ADDA-213E9916F0D3}" type="slidenum">
               <a:rPr lang="en-GB" smtClean="0"/>
-              <a:t>2</a:t>
+              <a:t>3</a:t>
             </a:fld>
             <a:endParaRPr lang="en-GB"/>
           </a:p>
@@ -22321,229 +22544,6 @@
     <p:extLst>
       <p:ext uri="{BB962C8B-B14F-4D97-AF65-F5344CB8AC3E}">
         <p14:creationId xmlns:p14="http://schemas.microsoft.com/office/powerpoint/2010/main" val="2601951424"/>
-      </p:ext>
-    </p:extLst>
-  </p:cSld>
-  <p:clrMapOvr>
-    <a:masterClrMapping/>
-  </p:clrMapOvr>
-</p:sld>
-</file>
-
-<file path=ppt/slides/slide3.xml><?xml version="1.0" encoding="utf-8"?>
-<p:sld xmlns:a="http://schemas.openxmlformats.org/drawingml/2006/main" xmlns:r="http://schemas.openxmlformats.org/officeDocument/2006/relationships" xmlns:p="http://schemas.openxmlformats.org/presentationml/2006/main">
-  <p:cSld>
-    <p:spTree>
-      <p:nvGrpSpPr>
-        <p:cNvPr id="1" name=""/>
-        <p:cNvGrpSpPr/>
-        <p:nvPr/>
-      </p:nvGrpSpPr>
-      <p:grpSpPr>
-        <a:xfrm>
-          <a:off x="0" y="0"/>
-          <a:ext cx="0" cy="0"/>
-          <a:chOff x="0" y="0"/>
-          <a:chExt cx="0" cy="0"/>
-        </a:xfrm>
-      </p:grpSpPr>
-      <p:sp>
-        <p:nvSpPr>
-          <p:cNvPr id="2" name="Title 1">
-            <a:extLst>
-              <a:ext uri="{FF2B5EF4-FFF2-40B4-BE49-F238E27FC236}">
-                <a16:creationId xmlns:a16="http://schemas.microsoft.com/office/drawing/2014/main" id="{67D32647-30F0-3B45-868F-FBC0B1734A50}"/>
-              </a:ext>
-            </a:extLst>
-          </p:cNvPr>
-          <p:cNvSpPr>
-            <a:spLocks noGrp="1"/>
-          </p:cNvSpPr>
-          <p:nvPr>
-            <p:ph type="title"/>
-          </p:nvPr>
-        </p:nvSpPr>
-        <p:spPr>
-          <a:xfrm>
-            <a:off x="1024127" y="402336"/>
-            <a:ext cx="10140401" cy="1219987"/>
-          </a:xfrm>
-        </p:spPr>
-        <p:txBody>
-          <a:bodyPr>
-            <a:normAutofit/>
-          </a:bodyPr>
-          <a:lstStyle/>
-          <a:p>
-            <a:r>
-              <a:rPr lang="en-GB" sz="3600" dirty="0"/>
-              <a:t>Multiple testing – </a:t>
-            </a:r>
-            <a:r>
-              <a:rPr lang="en-GB" sz="3600" dirty="0" err="1"/>
-              <a:t>Benjamini</a:t>
-            </a:r>
-            <a:r>
-              <a:rPr lang="en-GB" sz="3600" dirty="0"/>
-              <a:t>-Hochberg method</a:t>
-            </a:r>
-            <a:endParaRPr lang="en-GB" sz="3600" cap="none" dirty="0">
-              <a:latin typeface="+mn-lt"/>
-            </a:endParaRPr>
-          </a:p>
-        </p:txBody>
-      </p:sp>
-      <p:sp>
-        <p:nvSpPr>
-          <p:cNvPr id="4" name="Content Placeholder 3">
-            <a:extLst>
-              <a:ext uri="{FF2B5EF4-FFF2-40B4-BE49-F238E27FC236}">
-                <a16:creationId xmlns:a16="http://schemas.microsoft.com/office/drawing/2014/main" id="{5F0F6D09-21D1-B445-A0D3-811B8173FDA9}"/>
-              </a:ext>
-            </a:extLst>
-          </p:cNvPr>
-          <p:cNvSpPr>
-            <a:spLocks noGrp="1"/>
-          </p:cNvSpPr>
-          <p:nvPr>
-            <p:ph idx="1"/>
-          </p:nvPr>
-        </p:nvSpPr>
-        <p:spPr>
-          <a:xfrm>
-            <a:off x="1024129" y="1873045"/>
-            <a:ext cx="10140399" cy="4984955"/>
-          </a:xfrm>
-        </p:spPr>
-        <p:txBody>
-          <a:bodyPr>
-            <a:normAutofit/>
-          </a:bodyPr>
-          <a:lstStyle/>
-          <a:p>
-            <a:pPr marL="0" indent="0">
-              <a:buNone/>
-            </a:pPr>
-            <a:r>
-              <a:rPr lang="en-GB" sz="2400" dirty="0"/>
-              <a:t>For given </a:t>
-            </a:r>
-            <a:r>
-              <a:rPr lang="el-GR" sz="2400" dirty="0"/>
-              <a:t>α</a:t>
-            </a:r>
-            <a:r>
-              <a:rPr lang="en-GB" sz="2400" dirty="0"/>
-              <a:t> let k find the largest k such that P</a:t>
-            </a:r>
-            <a:r>
-              <a:rPr lang="en-GB" sz="2400" baseline="-25000" dirty="0"/>
-              <a:t>(k)</a:t>
-            </a:r>
-            <a:r>
-              <a:rPr lang="en-GB" sz="2400" dirty="0"/>
-              <a:t> ≤ (k/m)</a:t>
-            </a:r>
-            <a:r>
-              <a:rPr lang="el-GR" sz="2400" dirty="0"/>
-              <a:t> α</a:t>
-            </a:r>
-            <a:endParaRPr lang="en-GB" sz="2400" dirty="0"/>
-          </a:p>
-          <a:p>
-            <a:pPr marL="0" indent="0">
-              <a:buNone/>
-            </a:pPr>
-            <a:r>
-              <a:rPr lang="en-GB" sz="2400" dirty="0"/>
-              <a:t>and reject null hypothesis H</a:t>
-            </a:r>
-            <a:r>
-              <a:rPr lang="en-GB" sz="2400" baseline="-25000" dirty="0"/>
-              <a:t>i</a:t>
-            </a:r>
-            <a:r>
-              <a:rPr lang="en-GB" sz="2400" dirty="0"/>
-              <a:t> for </a:t>
-            </a:r>
-            <a:r>
-              <a:rPr lang="en-GB" sz="2400" dirty="0" err="1"/>
-              <a:t>i</a:t>
-            </a:r>
-            <a:r>
-              <a:rPr lang="en-GB" sz="2400" dirty="0"/>
-              <a:t>=1,..,k</a:t>
-            </a:r>
-          </a:p>
-          <a:p>
-            <a:pPr marL="811842" lvl="1" indent="-541338">
-              <a:lnSpc>
-                <a:spcPct val="150000"/>
-              </a:lnSpc>
-              <a:buFont typeface="Wingdings" pitchFamily="2" charset="2"/>
-              <a:buChar char="v"/>
-            </a:pPr>
-            <a:endParaRPr lang="en-GB" sz="1600" dirty="0">
-              <a:latin typeface="Menlo" panose="020B0609030804020204" pitchFamily="49" charset="0"/>
-              <a:ea typeface="Menlo" panose="020B0609030804020204" pitchFamily="49" charset="0"/>
-              <a:cs typeface="Menlo" panose="020B0609030804020204" pitchFamily="49" charset="0"/>
-            </a:endParaRPr>
-          </a:p>
-          <a:p>
-            <a:pPr marL="811842" lvl="1" indent="-541338">
-              <a:lnSpc>
-                <a:spcPct val="150000"/>
-              </a:lnSpc>
-              <a:buFont typeface="Wingdings" pitchFamily="2" charset="2"/>
-              <a:buChar char="v"/>
-            </a:pPr>
-            <a:endParaRPr lang="en-GB" sz="2200" dirty="0"/>
-          </a:p>
-          <a:p>
-            <a:pPr marL="811842" lvl="1" indent="-541338">
-              <a:lnSpc>
-                <a:spcPct val="150000"/>
-              </a:lnSpc>
-              <a:buFont typeface="Wingdings" pitchFamily="2" charset="2"/>
-              <a:buChar char="v"/>
-            </a:pPr>
-            <a:endParaRPr lang="en-GB" sz="2200" dirty="0"/>
-          </a:p>
-        </p:txBody>
-      </p:sp>
-      <p:sp>
-        <p:nvSpPr>
-          <p:cNvPr id="3" name="Slide Number Placeholder 2">
-            <a:extLst>
-              <a:ext uri="{FF2B5EF4-FFF2-40B4-BE49-F238E27FC236}">
-                <a16:creationId xmlns:a16="http://schemas.microsoft.com/office/drawing/2014/main" id="{C6E5CD97-EBA1-B146-AC2F-3BBCE1ADE91D}"/>
-              </a:ext>
-            </a:extLst>
-          </p:cNvPr>
-          <p:cNvSpPr>
-            <a:spLocks noGrp="1"/>
-          </p:cNvSpPr>
-          <p:nvPr>
-            <p:ph type="sldNum" sz="quarter" idx="12"/>
-          </p:nvPr>
-        </p:nvSpPr>
-        <p:spPr/>
-        <p:txBody>
-          <a:bodyPr/>
-          <a:lstStyle/>
-          <a:p>
-            <a:fld id="{9F3C1A03-04C2-0846-ADDA-213E9916F0D3}" type="slidenum">
-              <a:rPr lang="en-GB" smtClean="0"/>
-              <a:t>3</a:t>
-            </a:fld>
-            <a:endParaRPr lang="en-GB"/>
-          </a:p>
-        </p:txBody>
-      </p:sp>
-    </p:spTree>
-    <p:extLst>
-      <p:ext uri="{BB962C8B-B14F-4D97-AF65-F5344CB8AC3E}">
-        <p14:creationId xmlns:p14="http://schemas.microsoft.com/office/powerpoint/2010/main" val="2650360599"/>
       </p:ext>
     </p:extLst>
   </p:cSld>

</xml_diff>